<commit_message>
Added example of styling text and shapes via template
</commit_message>
<xml_diff>
--- a/demo/src/main/resources/template.pptx
+++ b/demo/src/main/resources/template.pptx
@@ -104,7 +104,27 @@
       </a:defRPr>
     </a:lvl9pPr>
   </p:defaultTextStyle>
+  <p:extLst>
+    <p:ext uri="{EFAFB233-063F-42B5-8137-9DF3F51BA10A}">
+      <p15:sldGuideLst xmlns:p15="http://schemas.microsoft.com/office/powerpoint/2012/main">
+        <p15:guide id="1" orient="horz" pos="2160">
+          <p15:clr>
+            <a:srgbClr val="A4A3A4"/>
+          </p15:clr>
+        </p15:guide>
+        <p15:guide id="2" pos="2880">
+          <p15:clr>
+            <a:srgbClr val="A4A3A4"/>
+          </p15:clr>
+        </p15:guide>
+      </p15:sldGuideLst>
+    </p:ext>
+  </p:extLst>
 </p:presentation>
+</file>
+
+<file path=ppt/revisionInfo.xml><?xml version="1.0" encoding="utf-8"?>
+<p1510:revInfo xmlns:a="http://schemas.openxmlformats.org/drawingml/2006/main" xmlns:r="http://schemas.openxmlformats.org/officeDocument/2006/relationships" xmlns:p1510="http://schemas.microsoft.com/office/powerpoint/2015/10/main"/>
 </file>
 
 <file path=ppt/slideLayouts/slideLayout1.xml><?xml version="1.0" encoding="utf-8"?>
@@ -145,10 +165,9 @@
           <a:lstStyle/>
           <a:p>
             <a:r>
-              <a:rPr lang="fr-FR" smtClean="0"/>
+              <a:rPr lang="fr-FR"/>
               <a:t>Cliquez pour modifier le style du titre</a:t>
             </a:r>
-            <a:endParaRPr lang="fr-FR"/>
           </a:p>
         </p:txBody>
       </p:sp>
@@ -264,10 +283,9 @@
           </a:lstStyle>
           <a:p>
             <a:r>
-              <a:rPr lang="fr-FR" smtClean="0"/>
+              <a:rPr lang="fr-FR"/>
               <a:t>Cliquez pour modifier le style des sous-titres du masque</a:t>
             </a:r>
-            <a:endParaRPr lang="fr-FR"/>
           </a:p>
         </p:txBody>
       </p:sp>
@@ -289,7 +307,7 @@
             <a:fld id="{3FD446A4-B7F7-4EA6-B2D1-ED8943CD3043}" type="datetimeFigureOut">
               <a:rPr lang="fr-FR" smtClean="0"/>
               <a:pPr/>
-              <a:t>23/12/2016</a:t>
+              <a:t>12/12/2017</a:t>
             </a:fld>
             <a:endParaRPr lang="fr-FR"/>
           </a:p>
@@ -332,7 +350,7 @@
             <a:fld id="{A0AEEAE9-4011-4619-AA6F-E6B51555CBCF}" type="slidenum">
               <a:rPr lang="fr-FR" smtClean="0"/>
               <a:pPr/>
-              <a:t>‹N°›</a:t>
+              <a:t>‹#›</a:t>
             </a:fld>
             <a:endParaRPr lang="fr-FR"/>
           </a:p>
@@ -379,10 +397,9 @@
           <a:lstStyle/>
           <a:p>
             <a:r>
-              <a:rPr lang="fr-FR" smtClean="0"/>
+              <a:rPr lang="fr-FR"/>
               <a:t>Cliquez pour modifier le style du titre</a:t>
             </a:r>
-            <a:endParaRPr lang="fr-FR"/>
           </a:p>
         </p:txBody>
       </p:sp>
@@ -403,38 +420,37 @@
           <a:p>
             <a:pPr lvl="0"/>
             <a:r>
-              <a:rPr lang="fr-FR" smtClean="0"/>
+              <a:rPr lang="fr-FR"/>
               <a:t>Cliquez pour modifier les styles du texte du masque</a:t>
             </a:r>
           </a:p>
           <a:p>
             <a:pPr lvl="1"/>
             <a:r>
-              <a:rPr lang="fr-FR" smtClean="0"/>
+              <a:rPr lang="fr-FR"/>
               <a:t>Deuxième niveau</a:t>
             </a:r>
           </a:p>
           <a:p>
             <a:pPr lvl="2"/>
             <a:r>
-              <a:rPr lang="fr-FR" smtClean="0"/>
+              <a:rPr lang="fr-FR"/>
               <a:t>Troisième niveau</a:t>
             </a:r>
           </a:p>
           <a:p>
             <a:pPr lvl="3"/>
             <a:r>
-              <a:rPr lang="fr-FR" smtClean="0"/>
+              <a:rPr lang="fr-FR"/>
               <a:t>Quatrième niveau</a:t>
             </a:r>
           </a:p>
           <a:p>
             <a:pPr lvl="4"/>
             <a:r>
-              <a:rPr lang="fr-FR" smtClean="0"/>
+              <a:rPr lang="fr-FR"/>
               <a:t>Cinquième niveau</a:t>
             </a:r>
-            <a:endParaRPr lang="fr-FR"/>
           </a:p>
         </p:txBody>
       </p:sp>
@@ -456,7 +472,7 @@
             <a:fld id="{3FD446A4-B7F7-4EA6-B2D1-ED8943CD3043}" type="datetimeFigureOut">
               <a:rPr lang="fr-FR" smtClean="0"/>
               <a:pPr/>
-              <a:t>23/12/2016</a:t>
+              <a:t>12/12/2017</a:t>
             </a:fld>
             <a:endParaRPr lang="fr-FR"/>
           </a:p>
@@ -499,7 +515,7 @@
             <a:fld id="{A0AEEAE9-4011-4619-AA6F-E6B51555CBCF}" type="slidenum">
               <a:rPr lang="fr-FR" smtClean="0"/>
               <a:pPr/>
-              <a:t>‹N°›</a:t>
+              <a:t>‹#›</a:t>
             </a:fld>
             <a:endParaRPr lang="fr-FR"/>
           </a:p>
@@ -551,10 +567,9 @@
           <a:lstStyle/>
           <a:p>
             <a:r>
-              <a:rPr lang="fr-FR" smtClean="0"/>
+              <a:rPr lang="fr-FR"/>
               <a:t>Cliquez pour modifier le style du titre</a:t>
             </a:r>
-            <a:endParaRPr lang="fr-FR"/>
           </a:p>
         </p:txBody>
       </p:sp>
@@ -580,38 +595,37 @@
           <a:p>
             <a:pPr lvl="0"/>
             <a:r>
-              <a:rPr lang="fr-FR" smtClean="0"/>
+              <a:rPr lang="fr-FR"/>
               <a:t>Cliquez pour modifier les styles du texte du masque</a:t>
             </a:r>
           </a:p>
           <a:p>
             <a:pPr lvl="1"/>
             <a:r>
-              <a:rPr lang="fr-FR" smtClean="0"/>
+              <a:rPr lang="fr-FR"/>
               <a:t>Deuxième niveau</a:t>
             </a:r>
           </a:p>
           <a:p>
             <a:pPr lvl="2"/>
             <a:r>
-              <a:rPr lang="fr-FR" smtClean="0"/>
+              <a:rPr lang="fr-FR"/>
               <a:t>Troisième niveau</a:t>
             </a:r>
           </a:p>
           <a:p>
             <a:pPr lvl="3"/>
             <a:r>
-              <a:rPr lang="fr-FR" smtClean="0"/>
+              <a:rPr lang="fr-FR"/>
               <a:t>Quatrième niveau</a:t>
             </a:r>
           </a:p>
           <a:p>
             <a:pPr lvl="4"/>
             <a:r>
-              <a:rPr lang="fr-FR" smtClean="0"/>
+              <a:rPr lang="fr-FR"/>
               <a:t>Cinquième niveau</a:t>
             </a:r>
-            <a:endParaRPr lang="fr-FR"/>
           </a:p>
         </p:txBody>
       </p:sp>
@@ -633,7 +647,7 @@
             <a:fld id="{3FD446A4-B7F7-4EA6-B2D1-ED8943CD3043}" type="datetimeFigureOut">
               <a:rPr lang="fr-FR" smtClean="0"/>
               <a:pPr/>
-              <a:t>23/12/2016</a:t>
+              <a:t>12/12/2017</a:t>
             </a:fld>
             <a:endParaRPr lang="fr-FR"/>
           </a:p>
@@ -676,7 +690,7 @@
             <a:fld id="{A0AEEAE9-4011-4619-AA6F-E6B51555CBCF}" type="slidenum">
               <a:rPr lang="fr-FR" smtClean="0"/>
               <a:pPr/>
-              <a:t>‹N°›</a:t>
+              <a:t>‹#›</a:t>
             </a:fld>
             <a:endParaRPr lang="fr-FR"/>
           </a:p>
@@ -723,10 +737,9 @@
           <a:lstStyle/>
           <a:p>
             <a:r>
-              <a:rPr lang="fr-FR" smtClean="0"/>
+              <a:rPr lang="fr-FR"/>
               <a:t>Cliquez pour modifier le style du titre</a:t>
             </a:r>
-            <a:endParaRPr lang="fr-FR"/>
           </a:p>
         </p:txBody>
       </p:sp>
@@ -747,38 +760,37 @@
           <a:p>
             <a:pPr lvl="0"/>
             <a:r>
-              <a:rPr lang="fr-FR" smtClean="0"/>
+              <a:rPr lang="fr-FR"/>
               <a:t>Cliquez pour modifier les styles du texte du masque</a:t>
             </a:r>
           </a:p>
           <a:p>
             <a:pPr lvl="1"/>
             <a:r>
-              <a:rPr lang="fr-FR" smtClean="0"/>
+              <a:rPr lang="fr-FR"/>
               <a:t>Deuxième niveau</a:t>
             </a:r>
           </a:p>
           <a:p>
             <a:pPr lvl="2"/>
             <a:r>
-              <a:rPr lang="fr-FR" smtClean="0"/>
+              <a:rPr lang="fr-FR"/>
               <a:t>Troisième niveau</a:t>
             </a:r>
           </a:p>
           <a:p>
             <a:pPr lvl="3"/>
             <a:r>
-              <a:rPr lang="fr-FR" smtClean="0"/>
+              <a:rPr lang="fr-FR"/>
               <a:t>Quatrième niveau</a:t>
             </a:r>
           </a:p>
           <a:p>
             <a:pPr lvl="4"/>
             <a:r>
-              <a:rPr lang="fr-FR" smtClean="0"/>
+              <a:rPr lang="fr-FR"/>
               <a:t>Cinquième niveau</a:t>
             </a:r>
-            <a:endParaRPr lang="fr-FR"/>
           </a:p>
         </p:txBody>
       </p:sp>
@@ -800,7 +812,7 @@
             <a:fld id="{3FD446A4-B7F7-4EA6-B2D1-ED8943CD3043}" type="datetimeFigureOut">
               <a:rPr lang="fr-FR" smtClean="0"/>
               <a:pPr/>
-              <a:t>23/12/2016</a:t>
+              <a:t>12/12/2017</a:t>
             </a:fld>
             <a:endParaRPr lang="fr-FR"/>
           </a:p>
@@ -843,7 +855,7 @@
             <a:fld id="{A0AEEAE9-4011-4619-AA6F-E6B51555CBCF}" type="slidenum">
               <a:rPr lang="fr-FR" smtClean="0"/>
               <a:pPr/>
-              <a:t>‹N°›</a:t>
+              <a:t>‹#›</a:t>
             </a:fld>
             <a:endParaRPr lang="fr-FR"/>
           </a:p>
@@ -899,10 +911,9 @@
           </a:lstStyle>
           <a:p>
             <a:r>
-              <a:rPr lang="fr-FR" smtClean="0"/>
+              <a:rPr lang="fr-FR"/>
               <a:t>Cliquez pour modifier le style du titre</a:t>
             </a:r>
-            <a:endParaRPr lang="fr-FR"/>
           </a:p>
         </p:txBody>
       </p:sp>
@@ -1019,7 +1030,7 @@
           <a:p>
             <a:pPr lvl="0"/>
             <a:r>
-              <a:rPr lang="fr-FR" smtClean="0"/>
+              <a:rPr lang="fr-FR"/>
               <a:t>Cliquez pour modifier les styles du texte du masque</a:t>
             </a:r>
           </a:p>
@@ -1043,7 +1054,7 @@
             <a:fld id="{3FD446A4-B7F7-4EA6-B2D1-ED8943CD3043}" type="datetimeFigureOut">
               <a:rPr lang="fr-FR" smtClean="0"/>
               <a:pPr/>
-              <a:t>23/12/2016</a:t>
+              <a:t>12/12/2017</a:t>
             </a:fld>
             <a:endParaRPr lang="fr-FR"/>
           </a:p>
@@ -1086,7 +1097,7 @@
             <a:fld id="{A0AEEAE9-4011-4619-AA6F-E6B51555CBCF}" type="slidenum">
               <a:rPr lang="fr-FR" smtClean="0"/>
               <a:pPr/>
-              <a:t>‹N°›</a:t>
+              <a:t>‹#›</a:t>
             </a:fld>
             <a:endParaRPr lang="fr-FR"/>
           </a:p>
@@ -1133,10 +1144,9 @@
           <a:lstStyle/>
           <a:p>
             <a:r>
-              <a:rPr lang="fr-FR" smtClean="0"/>
+              <a:rPr lang="fr-FR"/>
               <a:t>Cliquez pour modifier le style du titre</a:t>
             </a:r>
-            <a:endParaRPr lang="fr-FR"/>
           </a:p>
         </p:txBody>
       </p:sp>
@@ -1190,38 +1200,37 @@
           <a:p>
             <a:pPr lvl="0"/>
             <a:r>
-              <a:rPr lang="fr-FR" smtClean="0"/>
+              <a:rPr lang="fr-FR"/>
               <a:t>Cliquez pour modifier les styles du texte du masque</a:t>
             </a:r>
           </a:p>
           <a:p>
             <a:pPr lvl="1"/>
             <a:r>
-              <a:rPr lang="fr-FR" smtClean="0"/>
+              <a:rPr lang="fr-FR"/>
               <a:t>Deuxième niveau</a:t>
             </a:r>
           </a:p>
           <a:p>
             <a:pPr lvl="2"/>
             <a:r>
-              <a:rPr lang="fr-FR" smtClean="0"/>
+              <a:rPr lang="fr-FR"/>
               <a:t>Troisième niveau</a:t>
             </a:r>
           </a:p>
           <a:p>
             <a:pPr lvl="3"/>
             <a:r>
-              <a:rPr lang="fr-FR" smtClean="0"/>
+              <a:rPr lang="fr-FR"/>
               <a:t>Quatrième niveau</a:t>
             </a:r>
           </a:p>
           <a:p>
             <a:pPr lvl="4"/>
             <a:r>
-              <a:rPr lang="fr-FR" smtClean="0"/>
+              <a:rPr lang="fr-FR"/>
               <a:t>Cinquième niveau</a:t>
             </a:r>
-            <a:endParaRPr lang="fr-FR"/>
           </a:p>
         </p:txBody>
       </p:sp>
@@ -1275,38 +1284,37 @@
           <a:p>
             <a:pPr lvl="0"/>
             <a:r>
-              <a:rPr lang="fr-FR" smtClean="0"/>
+              <a:rPr lang="fr-FR"/>
               <a:t>Cliquez pour modifier les styles du texte du masque</a:t>
             </a:r>
           </a:p>
           <a:p>
             <a:pPr lvl="1"/>
             <a:r>
-              <a:rPr lang="fr-FR" smtClean="0"/>
+              <a:rPr lang="fr-FR"/>
               <a:t>Deuxième niveau</a:t>
             </a:r>
           </a:p>
           <a:p>
             <a:pPr lvl="2"/>
             <a:r>
-              <a:rPr lang="fr-FR" smtClean="0"/>
+              <a:rPr lang="fr-FR"/>
               <a:t>Troisième niveau</a:t>
             </a:r>
           </a:p>
           <a:p>
             <a:pPr lvl="3"/>
             <a:r>
-              <a:rPr lang="fr-FR" smtClean="0"/>
+              <a:rPr lang="fr-FR"/>
               <a:t>Quatrième niveau</a:t>
             </a:r>
           </a:p>
           <a:p>
             <a:pPr lvl="4"/>
             <a:r>
-              <a:rPr lang="fr-FR" smtClean="0"/>
+              <a:rPr lang="fr-FR"/>
               <a:t>Cinquième niveau</a:t>
             </a:r>
-            <a:endParaRPr lang="fr-FR"/>
           </a:p>
         </p:txBody>
       </p:sp>
@@ -1328,7 +1336,7 @@
             <a:fld id="{3FD446A4-B7F7-4EA6-B2D1-ED8943CD3043}" type="datetimeFigureOut">
               <a:rPr lang="fr-FR" smtClean="0"/>
               <a:pPr/>
-              <a:t>23/12/2016</a:t>
+              <a:t>12/12/2017</a:t>
             </a:fld>
             <a:endParaRPr lang="fr-FR"/>
           </a:p>
@@ -1371,7 +1379,7 @@
             <a:fld id="{A0AEEAE9-4011-4619-AA6F-E6B51555CBCF}" type="slidenum">
               <a:rPr lang="fr-FR" smtClean="0"/>
               <a:pPr/>
-              <a:t>‹N°›</a:t>
+              <a:t>‹#›</a:t>
             </a:fld>
             <a:endParaRPr lang="fr-FR"/>
           </a:p>
@@ -1422,10 +1430,9 @@
           </a:lstStyle>
           <a:p>
             <a:r>
-              <a:rPr lang="fr-FR" smtClean="0"/>
+              <a:rPr lang="fr-FR"/>
               <a:t>Cliquez pour modifier le style du titre</a:t>
             </a:r>
-            <a:endParaRPr lang="fr-FR"/>
           </a:p>
         </p:txBody>
       </p:sp>
@@ -1488,7 +1495,7 @@
           <a:p>
             <a:pPr lvl="0"/>
             <a:r>
-              <a:rPr lang="fr-FR" smtClean="0"/>
+              <a:rPr lang="fr-FR"/>
               <a:t>Cliquez pour modifier les styles du texte du masque</a:t>
             </a:r>
           </a:p>
@@ -1544,38 +1551,37 @@
           <a:p>
             <a:pPr lvl="0"/>
             <a:r>
-              <a:rPr lang="fr-FR" smtClean="0"/>
+              <a:rPr lang="fr-FR"/>
               <a:t>Cliquez pour modifier les styles du texte du masque</a:t>
             </a:r>
           </a:p>
           <a:p>
             <a:pPr lvl="1"/>
             <a:r>
-              <a:rPr lang="fr-FR" smtClean="0"/>
+              <a:rPr lang="fr-FR"/>
               <a:t>Deuxième niveau</a:t>
             </a:r>
           </a:p>
           <a:p>
             <a:pPr lvl="2"/>
             <a:r>
-              <a:rPr lang="fr-FR" smtClean="0"/>
+              <a:rPr lang="fr-FR"/>
               <a:t>Troisième niveau</a:t>
             </a:r>
           </a:p>
           <a:p>
             <a:pPr lvl="3"/>
             <a:r>
-              <a:rPr lang="fr-FR" smtClean="0"/>
+              <a:rPr lang="fr-FR"/>
               <a:t>Quatrième niveau</a:t>
             </a:r>
           </a:p>
           <a:p>
             <a:pPr lvl="4"/>
             <a:r>
-              <a:rPr lang="fr-FR" smtClean="0"/>
+              <a:rPr lang="fr-FR"/>
               <a:t>Cinquième niveau</a:t>
             </a:r>
-            <a:endParaRPr lang="fr-FR"/>
           </a:p>
         </p:txBody>
       </p:sp>
@@ -1638,7 +1644,7 @@
           <a:p>
             <a:pPr lvl="0"/>
             <a:r>
-              <a:rPr lang="fr-FR" smtClean="0"/>
+              <a:rPr lang="fr-FR"/>
               <a:t>Cliquez pour modifier les styles du texte du masque</a:t>
             </a:r>
           </a:p>
@@ -1694,38 +1700,37 @@
           <a:p>
             <a:pPr lvl="0"/>
             <a:r>
-              <a:rPr lang="fr-FR" smtClean="0"/>
+              <a:rPr lang="fr-FR"/>
               <a:t>Cliquez pour modifier les styles du texte du masque</a:t>
             </a:r>
           </a:p>
           <a:p>
             <a:pPr lvl="1"/>
             <a:r>
-              <a:rPr lang="fr-FR" smtClean="0"/>
+              <a:rPr lang="fr-FR"/>
               <a:t>Deuxième niveau</a:t>
             </a:r>
           </a:p>
           <a:p>
             <a:pPr lvl="2"/>
             <a:r>
-              <a:rPr lang="fr-FR" smtClean="0"/>
+              <a:rPr lang="fr-FR"/>
               <a:t>Troisième niveau</a:t>
             </a:r>
           </a:p>
           <a:p>
             <a:pPr lvl="3"/>
             <a:r>
-              <a:rPr lang="fr-FR" smtClean="0"/>
+              <a:rPr lang="fr-FR"/>
               <a:t>Quatrième niveau</a:t>
             </a:r>
           </a:p>
           <a:p>
             <a:pPr lvl="4"/>
             <a:r>
-              <a:rPr lang="fr-FR" smtClean="0"/>
+              <a:rPr lang="fr-FR"/>
               <a:t>Cinquième niveau</a:t>
             </a:r>
-            <a:endParaRPr lang="fr-FR"/>
           </a:p>
         </p:txBody>
       </p:sp>
@@ -1747,7 +1752,7 @@
             <a:fld id="{3FD446A4-B7F7-4EA6-B2D1-ED8943CD3043}" type="datetimeFigureOut">
               <a:rPr lang="fr-FR" smtClean="0"/>
               <a:pPr/>
-              <a:t>23/12/2016</a:t>
+              <a:t>12/12/2017</a:t>
             </a:fld>
             <a:endParaRPr lang="fr-FR"/>
           </a:p>
@@ -1790,7 +1795,7 @@
             <a:fld id="{A0AEEAE9-4011-4619-AA6F-E6B51555CBCF}" type="slidenum">
               <a:rPr lang="fr-FR" smtClean="0"/>
               <a:pPr/>
-              <a:t>‹N°›</a:t>
+              <a:t>‹#›</a:t>
             </a:fld>
             <a:endParaRPr lang="fr-FR"/>
           </a:p>
@@ -1837,10 +1842,9 @@
           <a:lstStyle/>
           <a:p>
             <a:r>
-              <a:rPr lang="fr-FR" smtClean="0"/>
+              <a:rPr lang="fr-FR"/>
               <a:t>Cliquez pour modifier le style du titre</a:t>
             </a:r>
-            <a:endParaRPr lang="fr-FR"/>
           </a:p>
         </p:txBody>
       </p:sp>
@@ -1862,7 +1866,7 @@
             <a:fld id="{3FD446A4-B7F7-4EA6-B2D1-ED8943CD3043}" type="datetimeFigureOut">
               <a:rPr lang="fr-FR" smtClean="0"/>
               <a:pPr/>
-              <a:t>23/12/2016</a:t>
+              <a:t>12/12/2017</a:t>
             </a:fld>
             <a:endParaRPr lang="fr-FR"/>
           </a:p>
@@ -1905,7 +1909,7 @@
             <a:fld id="{A0AEEAE9-4011-4619-AA6F-E6B51555CBCF}" type="slidenum">
               <a:rPr lang="fr-FR" smtClean="0"/>
               <a:pPr/>
-              <a:t>‹N°›</a:t>
+              <a:t>‹#›</a:t>
             </a:fld>
             <a:endParaRPr lang="fr-FR"/>
           </a:p>
@@ -1954,7 +1958,7 @@
             <a:fld id="{3FD446A4-B7F7-4EA6-B2D1-ED8943CD3043}" type="datetimeFigureOut">
               <a:rPr lang="fr-FR" smtClean="0"/>
               <a:pPr/>
-              <a:t>23/12/2016</a:t>
+              <a:t>12/12/2017</a:t>
             </a:fld>
             <a:endParaRPr lang="fr-FR"/>
           </a:p>
@@ -1997,7 +2001,7 @@
             <a:fld id="{A0AEEAE9-4011-4619-AA6F-E6B51555CBCF}" type="slidenum">
               <a:rPr lang="fr-FR" smtClean="0"/>
               <a:pPr/>
-              <a:t>‹N°›</a:t>
+              <a:t>‹#›</a:t>
             </a:fld>
             <a:endParaRPr lang="fr-FR"/>
           </a:p>
@@ -2053,10 +2057,9 @@
           </a:lstStyle>
           <a:p>
             <a:r>
-              <a:rPr lang="fr-FR" smtClean="0"/>
+              <a:rPr lang="fr-FR"/>
               <a:t>Cliquez pour modifier le style du titre</a:t>
             </a:r>
-            <a:endParaRPr lang="fr-FR"/>
           </a:p>
         </p:txBody>
       </p:sp>
@@ -2110,38 +2113,37 @@
           <a:p>
             <a:pPr lvl="0"/>
             <a:r>
-              <a:rPr lang="fr-FR" smtClean="0"/>
+              <a:rPr lang="fr-FR"/>
               <a:t>Cliquez pour modifier les styles du texte du masque</a:t>
             </a:r>
           </a:p>
           <a:p>
             <a:pPr lvl="1"/>
             <a:r>
-              <a:rPr lang="fr-FR" smtClean="0"/>
+              <a:rPr lang="fr-FR"/>
               <a:t>Deuxième niveau</a:t>
             </a:r>
           </a:p>
           <a:p>
             <a:pPr lvl="2"/>
             <a:r>
-              <a:rPr lang="fr-FR" smtClean="0"/>
+              <a:rPr lang="fr-FR"/>
               <a:t>Troisième niveau</a:t>
             </a:r>
           </a:p>
           <a:p>
             <a:pPr lvl="3"/>
             <a:r>
-              <a:rPr lang="fr-FR" smtClean="0"/>
+              <a:rPr lang="fr-FR"/>
               <a:t>Quatrième niveau</a:t>
             </a:r>
           </a:p>
           <a:p>
             <a:pPr lvl="4"/>
             <a:r>
-              <a:rPr lang="fr-FR" smtClean="0"/>
+              <a:rPr lang="fr-FR"/>
               <a:t>Cinquième niveau</a:t>
             </a:r>
-            <a:endParaRPr lang="fr-FR"/>
           </a:p>
         </p:txBody>
       </p:sp>
@@ -2204,7 +2206,7 @@
           <a:p>
             <a:pPr lvl="0"/>
             <a:r>
-              <a:rPr lang="fr-FR" smtClean="0"/>
+              <a:rPr lang="fr-FR"/>
               <a:t>Cliquez pour modifier les styles du texte du masque</a:t>
             </a:r>
           </a:p>
@@ -2228,7 +2230,7 @@
             <a:fld id="{3FD446A4-B7F7-4EA6-B2D1-ED8943CD3043}" type="datetimeFigureOut">
               <a:rPr lang="fr-FR" smtClean="0"/>
               <a:pPr/>
-              <a:t>23/12/2016</a:t>
+              <a:t>12/12/2017</a:t>
             </a:fld>
             <a:endParaRPr lang="fr-FR"/>
           </a:p>
@@ -2271,7 +2273,7 @@
             <a:fld id="{A0AEEAE9-4011-4619-AA6F-E6B51555CBCF}" type="slidenum">
               <a:rPr lang="fr-FR" smtClean="0"/>
               <a:pPr/>
-              <a:t>‹N°›</a:t>
+              <a:t>‹#›</a:t>
             </a:fld>
             <a:endParaRPr lang="fr-FR"/>
           </a:p>
@@ -2327,10 +2329,9 @@
           </a:lstStyle>
           <a:p>
             <a:r>
-              <a:rPr lang="fr-FR" smtClean="0"/>
+              <a:rPr lang="fr-FR"/>
               <a:t>Cliquez pour modifier le style du titre</a:t>
             </a:r>
-            <a:endParaRPr lang="fr-FR"/>
           </a:p>
         </p:txBody>
       </p:sp>
@@ -2454,7 +2455,7 @@
           <a:p>
             <a:pPr lvl="0"/>
             <a:r>
-              <a:rPr lang="fr-FR" smtClean="0"/>
+              <a:rPr lang="fr-FR"/>
               <a:t>Cliquez pour modifier les styles du texte du masque</a:t>
             </a:r>
           </a:p>
@@ -2478,7 +2479,7 @@
             <a:fld id="{3FD446A4-B7F7-4EA6-B2D1-ED8943CD3043}" type="datetimeFigureOut">
               <a:rPr lang="fr-FR" smtClean="0"/>
               <a:pPr/>
-              <a:t>23/12/2016</a:t>
+              <a:t>12/12/2017</a:t>
             </a:fld>
             <a:endParaRPr lang="fr-FR"/>
           </a:p>
@@ -2521,7 +2522,7 @@
             <a:fld id="{A0AEEAE9-4011-4619-AA6F-E6B51555CBCF}" type="slidenum">
               <a:rPr lang="fr-FR" smtClean="0"/>
               <a:pPr/>
-              <a:t>‹N°›</a:t>
+              <a:t>‹#›</a:t>
             </a:fld>
             <a:endParaRPr lang="fr-FR"/>
           </a:p>
@@ -2583,10 +2584,9 @@
           <a:lstStyle/>
           <a:p>
             <a:r>
-              <a:rPr lang="fr-FR" smtClean="0"/>
+              <a:rPr lang="fr-FR"/>
               <a:t>Cliquez pour modifier le style du titre</a:t>
             </a:r>
-            <a:endParaRPr lang="fr-FR"/>
           </a:p>
         </p:txBody>
       </p:sp>
@@ -2617,38 +2617,37 @@
           <a:p>
             <a:pPr lvl="0"/>
             <a:r>
-              <a:rPr lang="fr-FR" smtClean="0"/>
+              <a:rPr lang="fr-FR"/>
               <a:t>Cliquez pour modifier les styles du texte du masque</a:t>
             </a:r>
           </a:p>
           <a:p>
             <a:pPr lvl="1"/>
             <a:r>
-              <a:rPr lang="fr-FR" smtClean="0"/>
+              <a:rPr lang="fr-FR"/>
               <a:t>Deuxième niveau</a:t>
             </a:r>
           </a:p>
           <a:p>
             <a:pPr lvl="2"/>
             <a:r>
-              <a:rPr lang="fr-FR" smtClean="0"/>
+              <a:rPr lang="fr-FR"/>
               <a:t>Troisième niveau</a:t>
             </a:r>
           </a:p>
           <a:p>
             <a:pPr lvl="3"/>
             <a:r>
-              <a:rPr lang="fr-FR" smtClean="0"/>
+              <a:rPr lang="fr-FR"/>
               <a:t>Quatrième niveau</a:t>
             </a:r>
           </a:p>
           <a:p>
             <a:pPr lvl="4"/>
             <a:r>
-              <a:rPr lang="fr-FR" smtClean="0"/>
+              <a:rPr lang="fr-FR"/>
               <a:t>Cinquième niveau</a:t>
             </a:r>
-            <a:endParaRPr lang="fr-FR"/>
           </a:p>
         </p:txBody>
       </p:sp>
@@ -2688,7 +2687,7 @@
             <a:fld id="{3FD446A4-B7F7-4EA6-B2D1-ED8943CD3043}" type="datetimeFigureOut">
               <a:rPr lang="fr-FR" smtClean="0"/>
               <a:pPr/>
-              <a:t>23/12/2016</a:t>
+              <a:t>12/12/2017</a:t>
             </a:fld>
             <a:endParaRPr lang="fr-FR"/>
           </a:p>
@@ -2767,7 +2766,7 @@
             <a:fld id="{A0AEEAE9-4011-4619-AA6F-E6B51555CBCF}" type="slidenum">
               <a:rPr lang="fr-FR" smtClean="0"/>
               <a:pPr/>
-              <a:t>‹N°›</a:t>
+              <a:t>‹#›</a:t>
             </a:fld>
             <a:endParaRPr lang="fr-FR"/>
           </a:p>
@@ -3166,126 +3165,126 @@
           <a:lstStyle/>
           <a:p>
             <a:r>
-              <a:rPr lang="fr-FR" dirty="0" err="1" smtClean="0"/>
+              <a:rPr lang="fr-FR" dirty="0" err="1"/>
               <a:t>Some</a:t>
             </a:r>
-            <a:endParaRPr lang="fr-FR" dirty="0" smtClean="0"/>
-          </a:p>
-          <a:p>
-            <a:r>
-              <a:rPr lang="fr-FR" dirty="0" smtClean="0">
+            <a:endParaRPr lang="fr-FR" dirty="0"/>
+          </a:p>
+          <a:p>
+            <a:r>
+              <a:rPr lang="fr-FR" dirty="0">
                 <a:hlinkClick r:id="rId8"/>
               </a:rPr>
               <a:t>$/var1/</a:t>
             </a:r>
-            <a:endParaRPr lang="fr-FR" dirty="0" smtClean="0"/>
-          </a:p>
-          <a:p>
-            <a:r>
-              <a:rPr lang="fr-FR" dirty="0" smtClean="0">
+            <a:endParaRPr lang="fr-FR" dirty="0"/>
+          </a:p>
+          <a:p>
+            <a:r>
+              <a:rPr lang="fr-FR" dirty="0">
                 <a:hlinkClick r:id="rId4"/>
               </a:rPr>
               <a:t>$/var2/</a:t>
             </a:r>
-            <a:endParaRPr lang="fr-FR" dirty="0" smtClean="0"/>
-          </a:p>
-          <a:p>
-            <a:r>
-              <a:rPr lang="fr-FR" dirty="0" smtClean="0">
+            <a:endParaRPr lang="fr-FR" dirty="0"/>
+          </a:p>
+          <a:p>
+            <a:r>
+              <a:rPr lang="fr-FR" dirty="0">
                 <a:hlinkClick r:id="rId4"/>
               </a:rPr>
               <a:t>$/var2/</a:t>
             </a:r>
-            <a:endParaRPr lang="fr-FR" dirty="0" smtClean="0"/>
-          </a:p>
-          <a:p>
-            <a:r>
-              <a:rPr lang="fr-FR" dirty="0" smtClean="0">
+            <a:endParaRPr lang="fr-FR" dirty="0"/>
+          </a:p>
+          <a:p>
+            <a:r>
+              <a:rPr lang="fr-FR" dirty="0">
                 <a:hlinkClick r:id="rId4"/>
               </a:rPr>
               <a:t>$/var2/</a:t>
             </a:r>
-            <a:endParaRPr lang="fr-FR" dirty="0" smtClean="0"/>
-          </a:p>
-          <a:p>
-            <a:r>
-              <a:rPr lang="fr-FR" dirty="0" smtClean="0">
+            <a:endParaRPr lang="fr-FR" dirty="0"/>
+          </a:p>
+          <a:p>
+            <a:r>
+              <a:rPr lang="fr-FR" dirty="0">
                 <a:hlinkClick r:id="rId4"/>
               </a:rPr>
               <a:t>$/var2/</a:t>
             </a:r>
-            <a:endParaRPr lang="fr-FR" dirty="0" smtClean="0"/>
-          </a:p>
-          <a:p>
-            <a:r>
-              <a:rPr lang="fr-FR" dirty="0" smtClean="0">
+            <a:endParaRPr lang="fr-FR" dirty="0"/>
+          </a:p>
+          <a:p>
+            <a:r>
+              <a:rPr lang="fr-FR" dirty="0">
                 <a:hlinkClick r:id="rId4"/>
               </a:rPr>
               <a:t>$/var2/</a:t>
             </a:r>
-            <a:endParaRPr lang="fr-FR" dirty="0" smtClean="0"/>
-          </a:p>
-          <a:p>
-            <a:r>
-              <a:rPr lang="fr-FR" dirty="0" smtClean="0">
+            <a:endParaRPr lang="fr-FR" dirty="0"/>
+          </a:p>
+          <a:p>
+            <a:r>
+              <a:rPr lang="fr-FR" dirty="0">
                 <a:hlinkClick r:id="rId4"/>
               </a:rPr>
               <a:t>$/var2/</a:t>
             </a:r>
-            <a:endParaRPr lang="fr-FR" dirty="0" smtClean="0"/>
-          </a:p>
-          <a:p>
-            <a:r>
-              <a:rPr lang="fr-FR" dirty="0" smtClean="0">
+            <a:endParaRPr lang="fr-FR" dirty="0"/>
+          </a:p>
+          <a:p>
+            <a:r>
+              <a:rPr lang="fr-FR" dirty="0">
                 <a:hlinkClick r:id="rId4"/>
               </a:rPr>
               <a:t>$/var2/</a:t>
             </a:r>
-            <a:endParaRPr lang="fr-FR" dirty="0" smtClean="0"/>
-          </a:p>
-          <a:p>
-            <a:endParaRPr lang="fr-FR" dirty="0" smtClean="0"/>
-          </a:p>
-          <a:p>
-            <a:r>
-              <a:rPr lang="fr-FR" dirty="0" err="1" smtClean="0"/>
+            <a:endParaRPr lang="fr-FR" dirty="0"/>
+          </a:p>
+          <a:p>
+            <a:endParaRPr lang="fr-FR" dirty="0"/>
+          </a:p>
+          <a:p>
+            <a:r>
+              <a:rPr lang="fr-FR" dirty="0" err="1"/>
               <a:t>Text</a:t>
             </a:r>
-            <a:endParaRPr lang="fr-FR" dirty="0" smtClean="0"/>
-          </a:p>
-          <a:p>
-            <a:r>
-              <a:rPr lang="fr-FR" dirty="0" smtClean="0">
+            <a:endParaRPr lang="fr-FR" dirty="0"/>
+          </a:p>
+          <a:p>
+            <a:r>
+              <a:rPr lang="fr-FR" dirty="0">
                 <a:hlinkClick r:id="rId4"/>
               </a:rPr>
               <a:t>$/var2/</a:t>
             </a:r>
-            <a:endParaRPr lang="fr-FR" dirty="0" smtClean="0"/>
-          </a:p>
-          <a:p>
-            <a:r>
-              <a:rPr lang="fr-FR" dirty="0" smtClean="0">
+            <a:endParaRPr lang="fr-FR" dirty="0"/>
+          </a:p>
+          <a:p>
+            <a:r>
+              <a:rPr lang="fr-FR" dirty="0">
                 <a:hlinkClick r:id="rId4"/>
               </a:rPr>
               <a:t>$/var2/</a:t>
             </a:r>
-            <a:endParaRPr lang="fr-FR" dirty="0" smtClean="0"/>
-          </a:p>
-          <a:p>
-            <a:r>
-              <a:rPr lang="fr-FR" dirty="0" smtClean="0">
+            <a:endParaRPr lang="fr-FR" dirty="0"/>
+          </a:p>
+          <a:p>
+            <a:r>
+              <a:rPr lang="fr-FR" dirty="0">
                 <a:hlinkClick r:id="rId4"/>
               </a:rPr>
               <a:t>$/var2/</a:t>
             </a:r>
-            <a:endParaRPr lang="fr-FR" dirty="0" smtClean="0"/>
-          </a:p>
-          <a:p>
-            <a:endParaRPr lang="fr-FR" dirty="0" smtClean="0"/>
-          </a:p>
-          <a:p>
-            <a:r>
-              <a:rPr lang="fr-FR" dirty="0" smtClean="0"/>
+            <a:endParaRPr lang="fr-FR" dirty="0"/>
+          </a:p>
+          <a:p>
+            <a:endParaRPr lang="fr-FR" dirty="0"/>
+          </a:p>
+          <a:p>
+            <a:r>
+              <a:rPr lang="fr-FR" dirty="0"/>
               <a:t>Text3</a:t>
             </a:r>
           </a:p>
@@ -3330,7 +3329,7 @@
           <a:p>
             <a:pPr algn="ctr"/>
             <a:r>
-              <a:rPr lang="fr-FR" dirty="0" err="1" smtClean="0"/>
+              <a:rPr lang="fr-FR" dirty="0" err="1"/>
               <a:t>Shown</a:t>
             </a:r>
             <a:endParaRPr lang="fr-FR" dirty="0"/>
@@ -3376,7 +3375,7 @@
           <a:p>
             <a:pPr algn="ctr"/>
             <a:r>
-              <a:rPr lang="fr-FR" dirty="0" err="1" smtClean="0"/>
+              <a:rPr lang="fr-FR" dirty="0" err="1"/>
               <a:t>Hidden</a:t>
             </a:r>
             <a:endParaRPr lang="fr-FR" dirty="0"/>
@@ -3402,8 +3401,20 @@
                 <a:tableStyleId>{5C22544A-7EE6-4342-B048-85BDC9FD1C3A}</a:tableStyleId>
               </a:tblPr>
               <a:tblGrid>
-                <a:gridCol w="3048000"/>
-                <a:gridCol w="3048000"/>
+                <a:gridCol w="3048000">
+                  <a:extLst>
+                    <a:ext uri="{9D8B030D-6E8A-4147-A177-3AD203B41FA5}">
+                      <a16:colId xmlns:a16="http://schemas.microsoft.com/office/drawing/2014/main" val="20000"/>
+                    </a:ext>
+                  </a:extLst>
+                </a:gridCol>
+                <a:gridCol w="3048000">
+                  <a:extLst>
+                    <a:ext uri="{9D8B030D-6E8A-4147-A177-3AD203B41FA5}">
+                      <a16:colId xmlns:a16="http://schemas.microsoft.com/office/drawing/2014/main" val="20001"/>
+                    </a:ext>
+                  </a:extLst>
+                </a:gridCol>
               </a:tblGrid>
               <a:tr h="370840">
                 <a:tc>
@@ -3412,10 +3423,9 @@
                     <a:lstStyle/>
                     <a:p>
                       <a:r>
-                        <a:rPr lang="fr-FR" dirty="0" smtClean="0"/>
+                        <a:rPr lang="fr-FR" dirty="0"/>
                         <a:t>Content</a:t>
                       </a:r>
-                      <a:endParaRPr lang="fr-FR" dirty="0"/>
                     </a:p>
                   </a:txBody>
                   <a:tcPr/>
@@ -3426,14 +3436,18 @@
                     <a:lstStyle/>
                     <a:p>
                       <a:r>
-                        <a:rPr lang="fr-FR" dirty="0" smtClean="0"/>
+                        <a:rPr lang="fr-FR" dirty="0"/>
                         <a:t>$/var3/</a:t>
                       </a:r>
-                      <a:endParaRPr lang="fr-FR" dirty="0"/>
                     </a:p>
                   </a:txBody>
                   <a:tcPr/>
                 </a:tc>
+                <a:extLst>
+                  <a:ext uri="{0D108BD9-81ED-4DB2-BD59-A6C34878D82A}">
+                    <a16:rowId xmlns:a16="http://schemas.microsoft.com/office/drawing/2014/main" val="10000"/>
+                  </a:ext>
+                </a:extLst>
               </a:tr>
               <a:tr h="370840">
                 <a:tc>
@@ -3442,10 +3456,9 @@
                     <a:lstStyle/>
                     <a:p>
                       <a:r>
-                        <a:rPr lang="fr-FR" dirty="0" smtClean="0"/>
+                        <a:rPr lang="fr-FR" dirty="0"/>
                         <a:t>$/var4/</a:t>
                       </a:r>
-                      <a:endParaRPr lang="fr-FR" dirty="0"/>
                     </a:p>
                   </a:txBody>
                   <a:tcPr/>
@@ -3460,6 +3473,11 @@
                   </a:txBody>
                   <a:tcPr/>
                 </a:tc>
+                <a:extLst>
+                  <a:ext uri="{0D108BD9-81ED-4DB2-BD59-A6C34878D82A}">
+                    <a16:rowId xmlns:a16="http://schemas.microsoft.com/office/drawing/2014/main" val="10001"/>
+                  </a:ext>
+                </a:extLst>
               </a:tr>
             </a:tbl>
           </a:graphicData>
@@ -3488,7 +3506,7 @@
           <a:lstStyle/>
           <a:p>
             <a:r>
-              <a:rPr lang="fr-FR" sz="1000" b="1" dirty="0" smtClean="0">
+              <a:rPr lang="fr-FR" sz="1000" b="1" dirty="0">
                 <a:solidFill>
                   <a:srgbClr val="FF0000"/>
                 </a:solidFill>
@@ -3496,14 +3514,13 @@
               <a:t>$/var1/ </a:t>
             </a:r>
             <a:r>
-              <a:rPr lang="fr-FR" sz="1000" dirty="0" err="1" smtClean="0"/>
+              <a:rPr lang="fr-FR" sz="1000" dirty="0" err="1"/>
               <a:t>text</a:t>
             </a:r>
             <a:r>
-              <a:rPr lang="fr-FR" sz="1000" dirty="0" smtClean="0"/>
+              <a:rPr lang="fr-FR" sz="1000" dirty="0"/>
               <a:t> normal</a:t>
             </a:r>
-            <a:endParaRPr lang="fr-FR" sz="1000" dirty="0"/>
           </a:p>
         </p:txBody>
       </p:sp>
@@ -3516,7 +3533,7 @@
         <p:spPr>
           <a:xfrm>
             <a:off x="323528" y="2204864"/>
-            <a:ext cx="1800200" cy="400110"/>
+            <a:ext cx="1800200" cy="707886"/>
           </a:xfrm>
           <a:prstGeom prst="rect">
             <a:avLst/>
@@ -3530,28 +3547,38 @@
           <a:lstStyle/>
           <a:p>
             <a:r>
-              <a:rPr lang="fr-FR" sz="1000" dirty="0" err="1" smtClean="0"/>
+              <a:rPr lang="fr-FR" sz="1000" dirty="0" err="1"/>
               <a:t>Unstyled</a:t>
             </a:r>
             <a:r>
-              <a:rPr lang="fr-FR" sz="1000" dirty="0" smtClean="0"/>
+              <a:rPr lang="fr-FR" sz="1000" dirty="0"/>
               <a:t> </a:t>
             </a:r>
             <a:r>
-              <a:rPr lang="fr-FR" sz="1000" dirty="0" err="1" smtClean="0"/>
+              <a:rPr lang="fr-FR" sz="1000" dirty="0" err="1"/>
               <a:t>text</a:t>
             </a:r>
-            <a:endParaRPr lang="fr-FR" sz="1000" dirty="0" smtClean="0"/>
-          </a:p>
-          <a:p>
-            <a:r>
-              <a:rPr lang="fr-FR" sz="1000" dirty="0" smtClean="0">
+            <a:endParaRPr lang="fr-FR" sz="1000" dirty="0"/>
+          </a:p>
+          <a:p>
+            <a:endParaRPr lang="fr-FR" sz="1000" dirty="0"/>
+          </a:p>
+          <a:p>
+            <a:r>
+              <a:rPr lang="fr-FR" sz="1000"/>
+              <a:t>sdsds</a:t>
+            </a:r>
+            <a:endParaRPr lang="fr-FR" sz="1000" dirty="0"/>
+          </a:p>
+          <a:p>
+            <a:r>
+              <a:rPr lang="fr-FR" sz="1000" dirty="0">
                 <a:hlinkClick r:id="rId9"/>
               </a:rPr>
               <a:t>To style </a:t>
             </a:r>
             <a:r>
-              <a:rPr lang="fr-FR" sz="1000" dirty="0" err="1" smtClean="0">
+              <a:rPr lang="fr-FR" sz="1000" dirty="0" err="1">
                 <a:hlinkClick r:id="rId9"/>
               </a:rPr>
               <a:t>text</a:t>
@@ -3599,10 +3626,9 @@
           <a:p>
             <a:pPr algn="ctr"/>
             <a:r>
-              <a:rPr lang="fr-FR" sz="1000" dirty="0" smtClean="0"/>
+              <a:rPr lang="fr-FR" sz="1000" dirty="0"/>
               <a:t>$/var4/</a:t>
             </a:r>
-            <a:endParaRPr lang="fr-FR" sz="1000" dirty="0"/>
           </a:p>
         </p:txBody>
       </p:sp>

</xml_diff>